<commit_message>
mise a jour 23/09
</commit_message>
<xml_diff>
--- a/Programmation structurée/P6 - Ordre de base, Algorithme/A62 - Présentations/Présentation Les conditions d'algo- Kadiri.pptx
+++ b/Programmation structurée/P6 - Ordre de base, Algorithme/A62 - Présentations/Présentation Les conditions d'algo- Kadiri.pptx
@@ -108,6 +108,11 @@
       </a:defRPr>
     </a:lvl9pPr>
   </p:defaultTextStyle>
+  <p:extLst>
+    <p:ext uri="{EFAFB233-063F-42B5-8137-9DF3F51BA10A}">
+      <p15:sldGuideLst xmlns:p15="http://schemas.microsoft.com/office/powerpoint/2012/main"/>
+    </p:ext>
+  </p:extLst>
 </p:presentation>
 </file>
 
@@ -280,7 +285,7 @@
           <a:p>
             <a:fld id="{1560D255-3738-48D4-89B0-3EE646E89E8D}" type="datetimeFigureOut">
               <a:rPr lang="fr-MA" smtClean="0"/>
-              <a:t>20/09/2019</a:t>
+              <a:t>21/09/2019</a:t>
             </a:fld>
             <a:endParaRPr lang="fr-MA"/>
           </a:p>
@@ -610,7 +615,7 @@
           <a:p>
             <a:fld id="{1560D255-3738-48D4-89B0-3EE646E89E8D}" type="datetimeFigureOut">
               <a:rPr lang="fr-MA" smtClean="0"/>
-              <a:t>20/09/2019</a:t>
+              <a:t>21/09/2019</a:t>
             </a:fld>
             <a:endParaRPr lang="fr-MA"/>
           </a:p>
@@ -790,7 +795,7 @@
           <a:p>
             <a:fld id="{1560D255-3738-48D4-89B0-3EE646E89E8D}" type="datetimeFigureOut">
               <a:rPr lang="fr-MA" smtClean="0"/>
-              <a:t>20/09/2019</a:t>
+              <a:t>21/09/2019</a:t>
             </a:fld>
             <a:endParaRPr lang="fr-MA"/>
           </a:p>
@@ -960,7 +965,7 @@
           <a:p>
             <a:fld id="{1560D255-3738-48D4-89B0-3EE646E89E8D}" type="datetimeFigureOut">
               <a:rPr lang="fr-MA" smtClean="0"/>
-              <a:t>20/09/2019</a:t>
+              <a:t>21/09/2019</a:t>
             </a:fld>
             <a:endParaRPr lang="fr-MA"/>
           </a:p>
@@ -1237,7 +1242,7 @@
           <a:p>
             <a:fld id="{1560D255-3738-48D4-89B0-3EE646E89E8D}" type="datetimeFigureOut">
               <a:rPr lang="fr-MA" smtClean="0"/>
-              <a:t>20/09/2019</a:t>
+              <a:t>21/09/2019</a:t>
             </a:fld>
             <a:endParaRPr lang="fr-MA"/>
           </a:p>
@@ -1631,7 +1636,7 @@
           <a:p>
             <a:fld id="{1560D255-3738-48D4-89B0-3EE646E89E8D}" type="datetimeFigureOut">
               <a:rPr lang="fr-MA" smtClean="0"/>
-              <a:t>20/09/2019</a:t>
+              <a:t>21/09/2019</a:t>
             </a:fld>
             <a:endParaRPr lang="fr-MA"/>
           </a:p>
@@ -2108,7 +2113,7 @@
           <a:p>
             <a:fld id="{1560D255-3738-48D4-89B0-3EE646E89E8D}" type="datetimeFigureOut">
               <a:rPr lang="fr-MA" smtClean="0"/>
-              <a:t>20/09/2019</a:t>
+              <a:t>21/09/2019</a:t>
             </a:fld>
             <a:endParaRPr lang="fr-MA"/>
           </a:p>
@@ -2226,7 +2231,7 @@
           <a:p>
             <a:fld id="{1560D255-3738-48D4-89B0-3EE646E89E8D}" type="datetimeFigureOut">
               <a:rPr lang="fr-MA" smtClean="0"/>
-              <a:t>20/09/2019</a:t>
+              <a:t>21/09/2019</a:t>
             </a:fld>
             <a:endParaRPr lang="fr-MA"/>
           </a:p>
@@ -2321,7 +2326,7 @@
           <a:p>
             <a:fld id="{1560D255-3738-48D4-89B0-3EE646E89E8D}" type="datetimeFigureOut">
               <a:rPr lang="fr-MA" smtClean="0"/>
-              <a:t>20/09/2019</a:t>
+              <a:t>21/09/2019</a:t>
             </a:fld>
             <a:endParaRPr lang="fr-MA"/>
           </a:p>
@@ -2667,7 +2672,7 @@
           <a:p>
             <a:fld id="{1560D255-3738-48D4-89B0-3EE646E89E8D}" type="datetimeFigureOut">
               <a:rPr lang="fr-MA" smtClean="0"/>
-              <a:t>20/09/2019</a:t>
+              <a:t>21/09/2019</a:t>
             </a:fld>
             <a:endParaRPr lang="fr-MA"/>
           </a:p>
@@ -3055,7 +3060,7 @@
           <a:p>
             <a:fld id="{1560D255-3738-48D4-89B0-3EE646E89E8D}" type="datetimeFigureOut">
               <a:rPr lang="fr-MA" smtClean="0"/>
-              <a:t>20/09/2019</a:t>
+              <a:t>21/09/2019</a:t>
             </a:fld>
             <a:endParaRPr lang="fr-MA"/>
           </a:p>
@@ -3333,7 +3338,7 @@
           <a:p>
             <a:fld id="{1560D255-3738-48D4-89B0-3EE646E89E8D}" type="datetimeFigureOut">
               <a:rPr lang="fr-MA" smtClean="0"/>
-              <a:t>20/09/2019</a:t>
+              <a:t>21/09/2019</a:t>
             </a:fld>
             <a:endParaRPr lang="fr-MA"/>
           </a:p>
@@ -4113,7 +4118,7 @@
           <a:p>
             <a:r>
               <a:rPr lang="fr-MA" b="1" dirty="0"/>
-              <a:t>Lecture Et Affichage :</a:t>
+              <a:t>Ecriture Et Affichage :</a:t>
             </a:r>
             <a:endParaRPr lang="fr-MA" dirty="0"/>
           </a:p>

</xml_diff>